<commit_message>
Removed last slide form Lecture 23.
</commit_message>
<xml_diff>
--- a/University_of_Waterloo/Fall_2021/MATH135/UW_Fall2021_MATH135_Lecture23.pptx
+++ b/University_of_Waterloo/Fall_2021/MATH135/UW_Fall2021_MATH135_Lecture23.pptx
@@ -5,7 +5,7 @@
     <p:sldMasterId id="2147483648" r:id="rId1"/>
   </p:sldMasterIdLst>
   <p:notesMasterIdLst>
-    <p:notesMasterId r:id="rId28"/>
+    <p:notesMasterId r:id="rId27"/>
   </p:notesMasterIdLst>
   <p:sldIdLst>
     <p:sldId id="379" r:id="rId2"/>
@@ -33,7 +33,6 @@
     <p:sldId id="625" r:id="rId24"/>
     <p:sldId id="584" r:id="rId25"/>
     <p:sldId id="626" r:id="rId26"/>
-    <p:sldId id="579" r:id="rId27"/>
   </p:sldIdLst>
   <p:sldSz cx="12192000" cy="6858000"/>
   <p:notesSz cx="6858000" cy="9144000"/>
@@ -18873,120 +18872,6 @@
       <p:transition spd="slow" advTm="240000"/>
     </mc:Fallback>
   </mc:AlternateContent>
-</p:sld>
-</file>
-
-<file path=ppt/slides/slide26.xml><?xml version="1.0" encoding="utf-8"?>
-<p:sld xmlns:a="http://schemas.openxmlformats.org/drawingml/2006/main" xmlns:r="http://schemas.openxmlformats.org/officeDocument/2006/relationships" xmlns:p="http://schemas.openxmlformats.org/presentationml/2006/main">
-  <p:cSld>
-    <p:spTree>
-      <p:nvGrpSpPr>
-        <p:cNvPr id="1" name=""/>
-        <p:cNvGrpSpPr/>
-        <p:nvPr/>
-      </p:nvGrpSpPr>
-      <p:grpSpPr>
-        <a:xfrm>
-          <a:off x="0" y="0"/>
-          <a:ext cx="0" cy="0"/>
-          <a:chOff x="0" y="0"/>
-          <a:chExt cx="0" cy="0"/>
-        </a:xfrm>
-      </p:grpSpPr>
-      <p:sp>
-        <p:nvSpPr>
-          <p:cNvPr id="8" name="TextBox 7">
-            <a:extLst>
-              <a:ext uri="{FF2B5EF4-FFF2-40B4-BE49-F238E27FC236}">
-                <a16:creationId xmlns:a16="http://schemas.microsoft.com/office/drawing/2014/main" id="{0A7C9D80-BF37-43ED-815E-E2F6A6C00976}"/>
-              </a:ext>
-            </a:extLst>
-          </p:cNvPr>
-          <p:cNvSpPr txBox="1"/>
-          <p:nvPr/>
-        </p:nvSpPr>
-        <p:spPr>
-          <a:xfrm>
-            <a:off x="389106" y="325239"/>
-            <a:ext cx="12260062" cy="6801862"/>
-          </a:xfrm>
-          <a:prstGeom prst="rect">
-            <a:avLst/>
-          </a:prstGeom>
-          <a:noFill/>
-        </p:spPr>
-        <p:txBody>
-          <a:bodyPr wrap="square">
-            <a:spAutoFit/>
-          </a:bodyPr>
-          <a:lstStyle/>
-          <a:p>
-            <a:r>
-              <a:rPr lang="en-US" sz="4000" b="1" u="sng" dirty="0"/>
-              <a:t>Less time on MATH 137 (60% needed in 135)</a:t>
-            </a:r>
-          </a:p>
-          <a:p>
-            <a:endParaRPr lang="en-US" sz="4000" b="1" u="sng" dirty="0"/>
-          </a:p>
-          <a:p>
-            <a:r>
-              <a:rPr lang="en-US" sz="4000" b="1" u="sng" dirty="0" err="1"/>
-              <a:t>TutorConnect</a:t>
-            </a:r>
-            <a:r>
-              <a:rPr lang="en-US" sz="4000" b="1" u="sng" dirty="0"/>
-              <a:t>: if no one replied, what to do </a:t>
-            </a:r>
-          </a:p>
-          <a:p>
-            <a:endParaRPr lang="en-US" sz="4000" b="1" u="sng" dirty="0"/>
-          </a:p>
-          <a:p>
-            <a:r>
-              <a:rPr lang="en-US" sz="4000" b="1" u="sng" dirty="0"/>
-              <a:t>Jason D’Souza apology</a:t>
-            </a:r>
-          </a:p>
-          <a:p>
-            <a:endParaRPr lang="en-US" sz="4000" b="1" u="sng" dirty="0"/>
-          </a:p>
-          <a:p>
-            <a:r>
-              <a:rPr lang="en-US" sz="4000" b="1" u="sng" dirty="0"/>
-              <a:t>Laith: EEA</a:t>
-            </a:r>
-          </a:p>
-          <a:p>
-            <a:endParaRPr lang="en-US" sz="4000" b="1" u="sng" dirty="0"/>
-          </a:p>
-          <a:p>
-            <a:r>
-              <a:rPr lang="en-US" sz="4000" b="1" u="sng" dirty="0"/>
-              <a:t>Survey results for overall satisfaction</a:t>
-            </a:r>
-          </a:p>
-          <a:p>
-            <a:r>
-              <a:rPr lang="en-US" sz="4000" b="1" u="sng" dirty="0"/>
-              <a:t>Privacy and videos</a:t>
-            </a:r>
-          </a:p>
-          <a:p>
-            <a:endParaRPr lang="en-US" sz="3600" b="1" dirty="0"/>
-          </a:p>
-        </p:txBody>
-      </p:sp>
-    </p:spTree>
-    <p:extLst>
-      <p:ext uri="{BB962C8B-B14F-4D97-AF65-F5344CB8AC3E}">
-        <p14:creationId xmlns:p14="http://schemas.microsoft.com/office/powerpoint/2010/main" val="2583035065"/>
-      </p:ext>
-    </p:extLst>
-  </p:cSld>
-  <p:clrMapOvr>
-    <a:masterClrMapping/>
-  </p:clrMapOvr>
 </p:sld>
 </file>
 

</xml_diff>